<commit_message>
upload changes to ppt file
</commit_message>
<xml_diff>
--- a/Java SE 8 Teaching Material/Chapter 7 - Using Decision Statement.pptx
+++ b/Java SE 8 Teaching Material/Chapter 7 - Using Decision Statement.pptx
@@ -1602,7 +1602,7 @@
           <a:p>
             <a:fld id="{7664DC43-F744-704A-A194-E80C7BE54CAA}" type="datetimeFigureOut">
               <a:rPr lang="en-VN" smtClean="0"/>
-              <a:t>25/8/24</a:t>
+              <a:t>08/25/2024</a:t>
             </a:fld>
             <a:endParaRPr lang="en-VN"/>
           </a:p>
@@ -2017,7 +2017,7 @@
           <a:p>
             <a:fld id="{BAA8DE05-51EE-4692-B197-877FA1DAAAED}" type="datetimeFigureOut">
               <a:rPr lang="en-US" smtClean="0"/>
-              <a:t>8/25/24</a:t>
+              <a:t>8/25/2024</a:t>
             </a:fld>
             <a:endParaRPr lang="en-US"/>
           </a:p>
@@ -2215,7 +2215,7 @@
           <a:p>
             <a:fld id="{BAA8DE05-51EE-4692-B197-877FA1DAAAED}" type="datetimeFigureOut">
               <a:rPr lang="en-US" smtClean="0"/>
-              <a:t>8/25/24</a:t>
+              <a:t>8/25/2024</a:t>
             </a:fld>
             <a:endParaRPr lang="en-US"/>
           </a:p>
@@ -2423,7 +2423,7 @@
           <a:p>
             <a:fld id="{BAA8DE05-51EE-4692-B197-877FA1DAAAED}" type="datetimeFigureOut">
               <a:rPr lang="en-US" smtClean="0"/>
-              <a:t>8/25/24</a:t>
+              <a:t>8/25/2024</a:t>
             </a:fld>
             <a:endParaRPr lang="en-US"/>
           </a:p>
@@ -2621,7 +2621,7 @@
           <a:p>
             <a:fld id="{BAA8DE05-51EE-4692-B197-877FA1DAAAED}" type="datetimeFigureOut">
               <a:rPr lang="en-US" smtClean="0"/>
-              <a:t>8/25/24</a:t>
+              <a:t>8/25/2024</a:t>
             </a:fld>
             <a:endParaRPr lang="en-US"/>
           </a:p>
@@ -2896,7 +2896,7 @@
           <a:p>
             <a:fld id="{BAA8DE05-51EE-4692-B197-877FA1DAAAED}" type="datetimeFigureOut">
               <a:rPr lang="en-US" smtClean="0"/>
-              <a:t>8/25/24</a:t>
+              <a:t>8/25/2024</a:t>
             </a:fld>
             <a:endParaRPr lang="en-US"/>
           </a:p>
@@ -3161,7 +3161,7 @@
           <a:p>
             <a:fld id="{BAA8DE05-51EE-4692-B197-877FA1DAAAED}" type="datetimeFigureOut">
               <a:rPr lang="en-US" smtClean="0"/>
-              <a:t>8/25/24</a:t>
+              <a:t>8/25/2024</a:t>
             </a:fld>
             <a:endParaRPr lang="en-US"/>
           </a:p>
@@ -3573,7 +3573,7 @@
           <a:p>
             <a:fld id="{BAA8DE05-51EE-4692-B197-877FA1DAAAED}" type="datetimeFigureOut">
               <a:rPr lang="en-US" smtClean="0"/>
-              <a:t>8/25/24</a:t>
+              <a:t>8/25/2024</a:t>
             </a:fld>
             <a:endParaRPr lang="en-US"/>
           </a:p>
@@ -3714,7 +3714,7 @@
           <a:p>
             <a:fld id="{BAA8DE05-51EE-4692-B197-877FA1DAAAED}" type="datetimeFigureOut">
               <a:rPr lang="en-US" smtClean="0"/>
-              <a:t>8/25/24</a:t>
+              <a:t>8/25/2024</a:t>
             </a:fld>
             <a:endParaRPr lang="en-US"/>
           </a:p>
@@ -3827,7 +3827,7 @@
           <a:p>
             <a:fld id="{BAA8DE05-51EE-4692-B197-877FA1DAAAED}" type="datetimeFigureOut">
               <a:rPr lang="en-US" smtClean="0"/>
-              <a:t>8/25/24</a:t>
+              <a:t>8/25/2024</a:t>
             </a:fld>
             <a:endParaRPr lang="en-US"/>
           </a:p>
@@ -4138,7 +4138,7 @@
           <a:p>
             <a:fld id="{BAA8DE05-51EE-4692-B197-877FA1DAAAED}" type="datetimeFigureOut">
               <a:rPr lang="en-US" smtClean="0"/>
-              <a:t>8/25/24</a:t>
+              <a:t>8/25/2024</a:t>
             </a:fld>
             <a:endParaRPr lang="en-US"/>
           </a:p>
@@ -4426,7 +4426,7 @@
           <a:p>
             <a:fld id="{BAA8DE05-51EE-4692-B197-877FA1DAAAED}" type="datetimeFigureOut">
               <a:rPr lang="en-US" smtClean="0"/>
-              <a:t>8/25/24</a:t>
+              <a:t>8/25/2024</a:t>
             </a:fld>
             <a:endParaRPr lang="en-US"/>
           </a:p>
@@ -4667,7 +4667,7 @@
           <a:p>
             <a:fld id="{BAA8DE05-51EE-4692-B197-877FA1DAAAED}" type="datetimeFigureOut">
               <a:rPr lang="en-US" smtClean="0"/>
-              <a:t>8/25/24</a:t>
+              <a:t>8/25/2024</a:t>
             </a:fld>
             <a:endParaRPr lang="en-US"/>
           </a:p>

</xml_diff>